<commit_message>
Update PowerPoint presentation with GitHub slide and small changes
</commit_message>
<xml_diff>
--- a/Midi-Techno - Git.pptx
+++ b/Midi-Techno - Git.pptx
@@ -5,10 +5,10 @@
     <p:sldMasterId id="2147484033" r:id="rId1"/>
   </p:sldMasterIdLst>
   <p:notesMasterIdLst>
-    <p:notesMasterId r:id="rId16"/>
+    <p:notesMasterId r:id="rId17"/>
   </p:notesMasterIdLst>
   <p:handoutMasterIdLst>
-    <p:handoutMasterId r:id="rId17"/>
+    <p:handoutMasterId r:id="rId18"/>
   </p:handoutMasterIdLst>
   <p:sldIdLst>
     <p:sldId id="308" r:id="rId2"/>
@@ -19,12 +19,13 @@
     <p:sldId id="354" r:id="rId7"/>
     <p:sldId id="355" r:id="rId8"/>
     <p:sldId id="348" r:id="rId9"/>
-    <p:sldId id="356" r:id="rId10"/>
-    <p:sldId id="350" r:id="rId11"/>
-    <p:sldId id="353" r:id="rId12"/>
-    <p:sldId id="351" r:id="rId13"/>
-    <p:sldId id="349" r:id="rId14"/>
-    <p:sldId id="345" r:id="rId15"/>
+    <p:sldId id="357" r:id="rId10"/>
+    <p:sldId id="356" r:id="rId11"/>
+    <p:sldId id="350" r:id="rId12"/>
+    <p:sldId id="353" r:id="rId13"/>
+    <p:sldId id="351" r:id="rId14"/>
+    <p:sldId id="349" r:id="rId15"/>
+    <p:sldId id="345" r:id="rId16"/>
   </p:sldIdLst>
   <p:sldSz cx="9144000" cy="6858000" type="screen4x3"/>
   <p:notesSz cx="6997700" cy="9283700"/>
@@ -261,7 +262,7 @@
               <a:pPr>
                 <a:defRPr/>
               </a:pPr>
-              <a:t>3/4/2013</a:t>
+              <a:t>3/5/2013</a:t>
             </a:fld>
             <a:endParaRPr lang="en-US"/>
           </a:p>
@@ -468,7 +469,7 @@
               <a:pPr>
                 <a:defRPr/>
               </a:pPr>
-              <a:t>3/4/2013</a:t>
+              <a:t>3/5/2013</a:t>
             </a:fld>
             <a:endParaRPr lang="en-US"/>
           </a:p>
@@ -3064,7 +3065,7 @@
           <a:p>
             <a:r>
               <a:rPr lang="fr-CA" dirty="0" smtClean="0"/>
-              <a:t>Workflow</a:t>
+              <a:t>Let’s clone a project!</a:t>
             </a:r>
             <a:endParaRPr lang="en-CA" dirty="0"/>
           </a:p>
@@ -3072,6 +3073,38 @@
       </p:sp>
       <p:sp>
         <p:nvSpPr>
+          <p:cNvPr id="3" name="Espace réservé du contenu 2"/>
+          <p:cNvSpPr>
+            <a:spLocks noGrp="1"/>
+          </p:cNvSpPr>
+          <p:nvPr>
+            <p:ph idx="1"/>
+          </p:nvPr>
+        </p:nvSpPr>
+        <p:spPr/>
+        <p:txBody>
+          <a:bodyPr/>
+          <a:lstStyle/>
+          <a:p>
+            <a:r>
+              <a:rPr lang="fr-CA" dirty="0" smtClean="0">
+                <a:hlinkClick r:id="rId2"/>
+              </a:rPr>
+              <a:t>https://github.com/jlalande/webapp-demo</a:t>
+            </a:r>
+            <a:endParaRPr lang="fr-CA" dirty="0" smtClean="0"/>
+          </a:p>
+          <a:p>
+            <a:r>
+              <a:rPr lang="fr-CA" dirty="0" smtClean="0"/>
+              <a:t>git clone https://github.com/jlalande/webapp-demo.git</a:t>
+            </a:r>
+            <a:endParaRPr lang="en-CA" dirty="0"/>
+          </a:p>
+        </p:txBody>
+      </p:sp>
+      <p:sp>
+        <p:nvSpPr>
           <p:cNvPr id="4" name="Espace réservé du pied de page 3"/>
           <p:cNvSpPr>
             <a:spLocks noGrp="1"/>
@@ -3086,10 +3119,10 @@
           <a:lstStyle/>
           <a:p>
             <a:r>
-              <a:rPr lang="en-CA" dirty="0" smtClean="0"/>
-              <a:t>|   2013 03 04   |   CONFIDENTIAL</a:t>
-            </a:r>
-            <a:endParaRPr lang="en-CA" dirty="0"/>
+              <a:rPr lang="en-CA" smtClean="0"/>
+              <a:t>|   2010 10 20   |   CONFIDENTIAL</a:t>
+            </a:r>
+            <a:endParaRPr lang="en-CA"/>
           </a:p>
         </p:txBody>
       </p:sp>
@@ -3112,6 +3145,102 @@
               <a:rPr lang="fr-CA" smtClean="0"/>
               <a:pPr/>
               <a:t>10</a:t>
+            </a:fld>
+            <a:endParaRPr lang="fr-CA"/>
+          </a:p>
+        </p:txBody>
+      </p:sp>
+    </p:spTree>
+  </p:cSld>
+  <p:clrMapOvr>
+    <a:masterClrMapping/>
+  </p:clrMapOvr>
+  <p:transition/>
+</p:sld>
+</file>
+
+<file path=ppt/slides/slide11.xml><?xml version="1.0" encoding="utf-8"?>
+<p:sld xmlns:a="http://schemas.openxmlformats.org/drawingml/2006/main" xmlns:r="http://schemas.openxmlformats.org/officeDocument/2006/relationships" xmlns:p="http://schemas.openxmlformats.org/presentationml/2006/main">
+  <p:cSld>
+    <p:spTree>
+      <p:nvGrpSpPr>
+        <p:cNvPr id="1" name=""/>
+        <p:cNvGrpSpPr/>
+        <p:nvPr/>
+      </p:nvGrpSpPr>
+      <p:grpSpPr>
+        <a:xfrm>
+          <a:off x="0" y="0"/>
+          <a:ext cx="0" cy="0"/>
+          <a:chOff x="0" y="0"/>
+          <a:chExt cx="0" cy="0"/>
+        </a:xfrm>
+      </p:grpSpPr>
+      <p:sp>
+        <p:nvSpPr>
+          <p:cNvPr id="2" name="Titre 1"/>
+          <p:cNvSpPr>
+            <a:spLocks noGrp="1"/>
+          </p:cNvSpPr>
+          <p:nvPr>
+            <p:ph type="title"/>
+          </p:nvPr>
+        </p:nvSpPr>
+        <p:spPr/>
+        <p:txBody>
+          <a:bodyPr/>
+          <a:lstStyle/>
+          <a:p>
+            <a:r>
+              <a:rPr lang="fr-CA" dirty="0" smtClean="0"/>
+              <a:t>Workflow</a:t>
+            </a:r>
+            <a:endParaRPr lang="en-CA" dirty="0"/>
+          </a:p>
+        </p:txBody>
+      </p:sp>
+      <p:sp>
+        <p:nvSpPr>
+          <p:cNvPr id="4" name="Espace réservé du pied de page 3"/>
+          <p:cNvSpPr>
+            <a:spLocks noGrp="1"/>
+          </p:cNvSpPr>
+          <p:nvPr>
+            <p:ph type="ftr" sz="quarter" idx="10"/>
+          </p:nvPr>
+        </p:nvSpPr>
+        <p:spPr/>
+        <p:txBody>
+          <a:bodyPr/>
+          <a:lstStyle/>
+          <a:p>
+            <a:r>
+              <a:rPr lang="en-CA" dirty="0" smtClean="0"/>
+              <a:t>|   2013 03 04   |   CONFIDENTIAL</a:t>
+            </a:r>
+            <a:endParaRPr lang="en-CA" dirty="0"/>
+          </a:p>
+        </p:txBody>
+      </p:sp>
+      <p:sp>
+        <p:nvSpPr>
+          <p:cNvPr id="5" name="Espace réservé du numéro de diapositive 4"/>
+          <p:cNvSpPr>
+            <a:spLocks noGrp="1"/>
+          </p:cNvSpPr>
+          <p:nvPr>
+            <p:ph type="sldNum" sz="quarter" idx="11"/>
+          </p:nvPr>
+        </p:nvSpPr>
+        <p:spPr/>
+        <p:txBody>
+          <a:bodyPr/>
+          <a:lstStyle/>
+          <a:p>
+            <a:fld id="{ABF41DA4-7D67-4350-94D1-6BAF10E35C8A}" type="slidenum">
+              <a:rPr lang="fr-CA" smtClean="0"/>
+              <a:pPr/>
+              <a:t>11</a:t>
             </a:fld>
             <a:endParaRPr lang="fr-CA"/>
           </a:p>
@@ -3158,7 +3287,7 @@
 </p:sld>
 </file>
 
-<file path=ppt/slides/slide11.xml><?xml version="1.0" encoding="utf-8"?>
+<file path=ppt/slides/slide12.xml><?xml version="1.0" encoding="utf-8"?>
 <p:sld xmlns:a="http://schemas.openxmlformats.org/drawingml/2006/main" xmlns:r="http://schemas.openxmlformats.org/officeDocument/2006/relationships" xmlns:p="http://schemas.openxmlformats.org/presentationml/2006/main">
   <p:cSld>
     <p:spTree>
@@ -3239,7 +3368,7 @@
             <a:fld id="{ABF41DA4-7D67-4350-94D1-6BAF10E35C8A}" type="slidenum">
               <a:rPr lang="fr-CA" smtClean="0"/>
               <a:pPr/>
-              <a:t>11</a:t>
+              <a:t>12</a:t>
             </a:fld>
             <a:endParaRPr lang="fr-CA"/>
           </a:p>
@@ -3282,7 +3411,7 @@
 </p:sld>
 </file>
 
-<file path=ppt/slides/slide12.xml><?xml version="1.0" encoding="utf-8"?>
+<file path=ppt/slides/slide13.xml><?xml version="1.0" encoding="utf-8"?>
 <p:sld xmlns:a="http://schemas.openxmlformats.org/drawingml/2006/main" xmlns:r="http://schemas.openxmlformats.org/officeDocument/2006/relationships" xmlns:p="http://schemas.openxmlformats.org/presentationml/2006/main">
   <p:cSld>
     <p:spTree>
@@ -3341,7 +3470,7 @@
 </p:sld>
 </file>
 
-<file path=ppt/slides/slide13.xml><?xml version="1.0" encoding="utf-8"?>
+<file path=ppt/slides/slide14.xml><?xml version="1.0" encoding="utf-8"?>
 <p:sld xmlns:a="http://schemas.openxmlformats.org/drawingml/2006/main" xmlns:r="http://schemas.openxmlformats.org/officeDocument/2006/relationships" xmlns:p="http://schemas.openxmlformats.org/presentationml/2006/main">
   <p:cSld>
     <p:spTree>
@@ -3400,7 +3529,7 @@
 </p:sld>
 </file>
 
-<file path=ppt/slides/slide14.xml><?xml version="1.0" encoding="utf-8"?>
+<file path=ppt/slides/slide15.xml><?xml version="1.0" encoding="utf-8"?>
 <p:sld xmlns:a="http://schemas.openxmlformats.org/drawingml/2006/main" xmlns:r="http://schemas.openxmlformats.org/officeDocument/2006/relationships" xmlns:p="http://schemas.openxmlformats.org/presentationml/2006/main">
   <p:cSld>
     <p:spTree>
@@ -3459,13 +3588,7 @@
               <a:rPr lang="en-CA" sz="2400" dirty="0" smtClean="0">
                 <a:hlinkClick r:id="rId2"/>
               </a:rPr>
-              <a:t>http://</a:t>
-            </a:r>
-            <a:r>
-              <a:rPr lang="en-CA" sz="2400" dirty="0" smtClean="0">
-                <a:hlinkClick r:id="rId2"/>
-              </a:rPr>
-              <a:t>git-scm.com/</a:t>
+              <a:t>http://git-scm.com/</a:t>
             </a:r>
             <a:endParaRPr lang="en-CA" sz="2400" dirty="0" smtClean="0"/>
           </a:p>
@@ -3492,13 +3615,7 @@
               <a:rPr lang="en-CA" sz="2400" dirty="0" smtClean="0">
                 <a:hlinkClick r:id="rId5"/>
               </a:rPr>
-              <a:t>http://nvie.com/posts/a-successful-git-branching-model</a:t>
-            </a:r>
-            <a:r>
-              <a:rPr lang="en-CA" sz="2400" dirty="0" smtClean="0">
-                <a:hlinkClick r:id="rId5"/>
-              </a:rPr>
-              <a:t>/</a:t>
+              <a:t>http://nvie.com/posts/a-successful-git-branching-model/</a:t>
             </a:r>
             <a:endParaRPr lang="en-CA" sz="2400" dirty="0" smtClean="0"/>
           </a:p>
@@ -3507,13 +3624,7 @@
               <a:rPr lang="en-CA" sz="2400" dirty="0" smtClean="0">
                 <a:hlinkClick r:id="rId6"/>
               </a:rPr>
-              <a:t>https://code.google.com/p/tortoisegit</a:t>
-            </a:r>
-            <a:r>
-              <a:rPr lang="en-CA" sz="2400" dirty="0" smtClean="0">
-                <a:hlinkClick r:id="rId6"/>
-              </a:rPr>
-              <a:t>/</a:t>
+              <a:t>https://code.google.com/p/tortoisegit/</a:t>
             </a:r>
             <a:endParaRPr lang="en-CA" sz="2400" dirty="0" smtClean="0"/>
           </a:p>
@@ -3522,13 +3633,7 @@
               <a:rPr lang="en-CA" sz="2400" dirty="0" smtClean="0">
                 <a:hlinkClick r:id="rId7"/>
               </a:rPr>
-              <a:t>http://</a:t>
-            </a:r>
-            <a:r>
-              <a:rPr lang="en-CA" sz="2400" dirty="0" smtClean="0">
-                <a:hlinkClick r:id="rId7"/>
-              </a:rPr>
-              <a:t>zrusin.blogspot.ca/2007/09/git-cheat-sheet.html</a:t>
+              <a:t>http://zrusin.blogspot.ca/2007/09/git-cheat-sheet.html</a:t>
             </a:r>
             <a:endParaRPr lang="en-CA" sz="2400" dirty="0" smtClean="0"/>
           </a:p>
@@ -3584,7 +3689,7 @@
             <a:fld id="{ABF41DA4-7D67-4350-94D1-6BAF10E35C8A}" type="slidenum">
               <a:rPr lang="fr-CA" smtClean="0"/>
               <a:pPr/>
-              <a:t>14</a:t>
+              <a:t>15</a:t>
             </a:fld>
             <a:endParaRPr lang="fr-CA"/>
           </a:p>
@@ -3651,15 +3756,7 @@
             </a:r>
             <a:r>
               <a:rPr lang="en-CA" sz="2800" dirty="0" smtClean="0"/>
-              <a:t>:</a:t>
-            </a:r>
-            <a:r>
-              <a:rPr lang="en-CA" sz="2800" dirty="0" smtClean="0"/>
-              <a:t> </a:t>
-            </a:r>
-            <a:r>
-              <a:rPr lang="en-CA" sz="2800" dirty="0" smtClean="0"/>
-              <a:t>Distributed Version Control System</a:t>
+              <a:t>: Distributed Version Control System</a:t>
             </a:r>
             <a:endParaRPr lang="en-CA" sz="2800" dirty="0"/>
           </a:p>
@@ -4023,15 +4120,7 @@
             <a:pPr algn="ctr"/>
             <a:r>
               <a:rPr lang="en-CA" dirty="0" smtClean="0"/>
-              <a:t>Humans </a:t>
-            </a:r>
-            <a:r>
-              <a:rPr lang="en-CA" dirty="0" smtClean="0"/>
-              <a:t>can manually keep track of versions of code</a:t>
-            </a:r>
-            <a:r>
-              <a:rPr lang="en-CA" dirty="0" smtClean="0"/>
-              <a:t>!</a:t>
+              <a:t>Humans can manually keep track of versions of code!</a:t>
             </a:r>
             <a:endParaRPr lang="en-US" dirty="0"/>
           </a:p>
@@ -4050,8 +4139,8 @@
           </a:xfrm>
           <a:prstGeom prst="wedgeRectCallout">
             <a:avLst>
-              <a:gd name="adj1" fmla="val 28206"/>
-              <a:gd name="adj2" fmla="val -77154"/>
+              <a:gd name="adj1" fmla="val 8414"/>
+              <a:gd name="adj2" fmla="val -78193"/>
             </a:avLst>
           </a:prstGeom>
           <a:gradFill>
@@ -4178,7 +4267,7 @@
           </a:xfrm>
           <a:prstGeom prst="wedgeRectCallout">
             <a:avLst>
-              <a:gd name="adj1" fmla="val 39011"/>
+              <a:gd name="adj1" fmla="val 30907"/>
               <a:gd name="adj2" fmla="val 69773"/>
             </a:avLst>
           </a:prstGeom>
@@ -4447,7 +4536,7 @@
                   <a:schemeClr val="bg1"/>
                 </a:solidFill>
               </a:rPr>
-              <a:t>1982</a:t>
+              <a:t>1985</a:t>
             </a:r>
             <a:endParaRPr lang="en-US" dirty="0">
               <a:solidFill>
@@ -4606,7 +4695,7 @@
           </a:xfrm>
           <a:prstGeom prst="wedgeRectCallout">
             <a:avLst>
-              <a:gd name="adj1" fmla="val 40258"/>
+              <a:gd name="adj1" fmla="val 28414"/>
               <a:gd name="adj2" fmla="val 68734"/>
             </a:avLst>
           </a:prstGeom>
@@ -4670,8 +4759,8 @@
           </a:xfrm>
           <a:prstGeom prst="wedgeRectCallout">
             <a:avLst>
-              <a:gd name="adj1" fmla="val -32677"/>
-              <a:gd name="adj2" fmla="val -76288"/>
+              <a:gd name="adj1" fmla="val -25249"/>
+              <a:gd name="adj2" fmla="val -75249"/>
             </a:avLst>
           </a:prstGeom>
           <a:gradFill>
@@ -4729,13 +4818,13 @@
         </p:nvSpPr>
         <p:spPr>
           <a:xfrm>
-            <a:off x="5248894" y="4355275"/>
+            <a:off x="4916385" y="4367151"/>
             <a:ext cx="2113807" cy="1143000"/>
           </a:xfrm>
           <a:prstGeom prst="wedgeRectCallout">
             <a:avLst>
-              <a:gd name="adj1" fmla="val 28206"/>
-              <a:gd name="adj2" fmla="val -77154"/>
+              <a:gd name="adj1" fmla="val 15285"/>
+              <a:gd name="adj2" fmla="val -78193"/>
             </a:avLst>
           </a:prstGeom>
           <a:gradFill>
@@ -4798,71 +4887,7 @@
           </a:xfrm>
           <a:prstGeom prst="wedgeRectCallout">
             <a:avLst>
-              <a:gd name="adj1" fmla="val 12829"/>
-              <a:gd name="adj2" fmla="val 71851"/>
-            </a:avLst>
-          </a:prstGeom>
-          <a:gradFill>
-            <a:gsLst>
-              <a:gs pos="0">
-                <a:schemeClr val="bg1">
-                  <a:lumMod val="95000"/>
-                </a:schemeClr>
-              </a:gs>
-              <a:gs pos="64999">
-                <a:schemeClr val="bg1"/>
-              </a:gs>
-              <a:gs pos="100000">
-                <a:schemeClr val="bg1">
-                  <a:lumMod val="85000"/>
-                </a:schemeClr>
-              </a:gs>
-            </a:gsLst>
-            <a:lin ang="5400000" scaled="0"/>
-          </a:gradFill>
-          <a:ln w="12700"/>
-        </p:spPr>
-        <p:style>
-          <a:lnRef idx="2">
-            <a:schemeClr val="dk1"/>
-          </a:lnRef>
-          <a:fillRef idx="1">
-            <a:schemeClr val="lt1"/>
-          </a:fillRef>
-          <a:effectRef idx="0">
-            <a:schemeClr val="dk1"/>
-          </a:effectRef>
-          <a:fontRef idx="minor">
-            <a:schemeClr val="dk1"/>
-          </a:fontRef>
-        </p:style>
-        <p:txBody>
-          <a:bodyPr rtlCol="0" anchor="ctr"/>
-          <a:lstStyle/>
-          <a:p>
-            <a:pPr algn="ctr"/>
-            <a:r>
-              <a:rPr lang="en-CA" dirty="0" smtClean="0"/>
-              <a:t>Free open source version control hosting!</a:t>
-            </a:r>
-            <a:endParaRPr lang="en-US" dirty="0"/>
-          </a:p>
-        </p:txBody>
-      </p:sp>
-      <p:sp>
-        <p:nvSpPr>
-          <p:cNvPr id="23" name="Rectangular Callout 16"/>
-          <p:cNvSpPr/>
-          <p:nvPr/>
-        </p:nvSpPr>
-        <p:spPr>
-          <a:xfrm>
-            <a:off x="6231081" y="2002971"/>
-            <a:ext cx="2259776" cy="1143000"/>
-          </a:xfrm>
-          <a:prstGeom prst="wedgeRectCallout">
-            <a:avLst>
-              <a:gd name="adj1" fmla="val 10108"/>
+              <a:gd name="adj1" fmla="val -12106"/>
               <a:gd name="adj2" fmla="val 70812"/>
             </a:avLst>
           </a:prstGeom>
@@ -4907,6 +4932,70 @@
             <a:pPr algn="ctr"/>
             <a:r>
               <a:rPr lang="en-CA" dirty="0" smtClean="0"/>
+              <a:t>Free open source version control hosting!</a:t>
+            </a:r>
+            <a:endParaRPr lang="en-US" dirty="0"/>
+          </a:p>
+        </p:txBody>
+      </p:sp>
+      <p:sp>
+        <p:nvSpPr>
+          <p:cNvPr id="23" name="Rectangular Callout 16"/>
+          <p:cNvSpPr/>
+          <p:nvPr/>
+        </p:nvSpPr>
+        <p:spPr>
+          <a:xfrm>
+            <a:off x="6231081" y="2002971"/>
+            <a:ext cx="2259776" cy="1143000"/>
+          </a:xfrm>
+          <a:prstGeom prst="wedgeRectCallout">
+            <a:avLst>
+              <a:gd name="adj1" fmla="val -14591"/>
+              <a:gd name="adj2" fmla="val 64578"/>
+            </a:avLst>
+          </a:prstGeom>
+          <a:gradFill>
+            <a:gsLst>
+              <a:gs pos="0">
+                <a:schemeClr val="bg1">
+                  <a:lumMod val="95000"/>
+                </a:schemeClr>
+              </a:gs>
+              <a:gs pos="64999">
+                <a:schemeClr val="bg1"/>
+              </a:gs>
+              <a:gs pos="100000">
+                <a:schemeClr val="bg1">
+                  <a:lumMod val="85000"/>
+                </a:schemeClr>
+              </a:gs>
+            </a:gsLst>
+            <a:lin ang="5400000" scaled="0"/>
+          </a:gradFill>
+          <a:ln w="12700"/>
+        </p:spPr>
+        <p:style>
+          <a:lnRef idx="2">
+            <a:schemeClr val="dk1"/>
+          </a:lnRef>
+          <a:fillRef idx="1">
+            <a:schemeClr val="lt1"/>
+          </a:fillRef>
+          <a:effectRef idx="0">
+            <a:schemeClr val="dk1"/>
+          </a:effectRef>
+          <a:fontRef idx="minor">
+            <a:schemeClr val="dk1"/>
+          </a:fontRef>
+        </p:style>
+        <p:txBody>
+          <a:bodyPr rtlCol="0" anchor="ctr"/>
+          <a:lstStyle/>
+          <a:p>
+            <a:pPr algn="ctr"/>
+            <a:r>
+              <a:rPr lang="en-CA" dirty="0" smtClean="0"/>
               <a:t>When you checkout that’s a fork too, and you can do that in public!</a:t>
             </a:r>
             <a:endParaRPr lang="en-US" dirty="0"/>
@@ -4941,7 +5030,7 @@
                   <a:schemeClr val="bg1"/>
                 </a:solidFill>
               </a:rPr>
-              <a:t>1986</a:t>
+              <a:t>1985</a:t>
             </a:r>
             <a:endParaRPr lang="en-US" dirty="0">
               <a:solidFill>
@@ -5017,7 +5106,7 @@
                   <a:schemeClr val="bg1"/>
                 </a:solidFill>
               </a:rPr>
-              <a:t>1994</a:t>
+              <a:t>1995</a:t>
             </a:r>
             <a:endParaRPr lang="en-US" dirty="0">
               <a:solidFill>
@@ -5055,7 +5144,7 @@
                   <a:schemeClr val="bg1"/>
                 </a:solidFill>
               </a:rPr>
-              <a:t>1998</a:t>
+              <a:t>2000</a:t>
             </a:r>
             <a:endParaRPr lang="en-US" dirty="0">
               <a:solidFill>
@@ -5093,7 +5182,7 @@
                   <a:schemeClr val="bg1"/>
                 </a:solidFill>
               </a:rPr>
-              <a:t>2002</a:t>
+              <a:t>2005</a:t>
             </a:r>
             <a:endParaRPr lang="en-US" dirty="0">
               <a:solidFill>
@@ -5131,7 +5220,7 @@
                   <a:schemeClr val="bg1"/>
                 </a:solidFill>
               </a:rPr>
-              <a:t>2008</a:t>
+              <a:t>2010</a:t>
             </a:r>
             <a:endParaRPr lang="en-US" dirty="0">
               <a:solidFill>
@@ -5233,7 +5322,15 @@
           <a:p>
             <a:r>
               <a:rPr lang="fr-CA" dirty="0" smtClean="0"/>
-              <a:t>Let’s create our first project!</a:t>
+              <a:t>Let’s create </a:t>
+            </a:r>
+            <a:r>
+              <a:rPr lang="fr-CA" dirty="0" smtClean="0"/>
+              <a:t>my first </a:t>
+            </a:r>
+            <a:r>
+              <a:rPr lang="fr-CA" dirty="0" smtClean="0"/>
+              <a:t>project!</a:t>
             </a:r>
             <a:endParaRPr lang="en-CA" dirty="0"/>
           </a:p>
@@ -5274,13 +5371,32 @@
           <a:p>
             <a:r>
               <a:rPr lang="fr-CA" dirty="0" smtClean="0"/>
-              <a:t>touch README.md</a:t>
-            </a:r>
-          </a:p>
-          <a:p>
+              <a:t>touch </a:t>
+            </a:r>
             <a:r>
               <a:rPr lang="fr-CA" dirty="0" smtClean="0"/>
-              <a:t>git commit -a -m 'First commit'</a:t>
+              <a:t>README.md</a:t>
+            </a:r>
+          </a:p>
+          <a:p>
+            <a:r>
+              <a:rPr lang="fr-CA" dirty="0" smtClean="0"/>
+              <a:t>git add README.md</a:t>
+            </a:r>
+            <a:endParaRPr lang="fr-CA" dirty="0" smtClean="0"/>
+          </a:p>
+          <a:p>
+            <a:r>
+              <a:rPr lang="fr-CA" dirty="0" smtClean="0"/>
+              <a:t>git </a:t>
+            </a:r>
+            <a:r>
+              <a:rPr lang="fr-CA" dirty="0" smtClean="0"/>
+              <a:t>commit </a:t>
+            </a:r>
+            <a:r>
+              <a:rPr lang="fr-CA" dirty="0" smtClean="0"/>
+              <a:t>-m 'First commit'</a:t>
             </a:r>
             <a:endParaRPr lang="en-CA" dirty="0"/>
           </a:p>
@@ -5500,7 +5616,7 @@
           <a:p>
             <a:r>
               <a:rPr lang="fr-CA" dirty="0" smtClean="0"/>
-              <a:t>Let’s clone a project!</a:t>
+              <a:t>Github – Social Coding</a:t>
             </a:r>
             <a:endParaRPr lang="en-CA" dirty="0"/>
           </a:p>
@@ -5516,25 +5632,32 @@
             <p:ph idx="1"/>
           </p:nvPr>
         </p:nvSpPr>
-        <p:spPr/>
+        <p:spPr>
+          <a:xfrm>
+            <a:off x="450850" y="1397001"/>
+            <a:ext cx="8240713" cy="2224974"/>
+          </a:xfrm>
+        </p:spPr>
         <p:txBody>
           <a:bodyPr/>
           <a:lstStyle/>
           <a:p>
             <a:r>
-              <a:rPr lang="fr-CA" dirty="0" smtClean="0">
-                <a:hlinkClick r:id="rId2"/>
-              </a:rPr>
-              <a:t>https://github.com/jlalande/webapp-demo</a:t>
-            </a:r>
-            <a:endParaRPr lang="fr-CA" dirty="0" smtClean="0"/>
-          </a:p>
-          <a:p>
-            <a:r>
-              <a:rPr lang="fr-CA" dirty="0" smtClean="0"/>
-              <a:t>git clone https://github.com/jlalande/webapp-demo.git</a:t>
-            </a:r>
-            <a:endParaRPr lang="en-CA" dirty="0"/>
+              <a:rPr lang="fr-CA" sz="2400" dirty="0" smtClean="0"/>
+              <a:t>Web-based hosting service for software development projects</a:t>
+            </a:r>
+          </a:p>
+          <a:p>
+            <a:r>
+              <a:rPr lang="fr-CA" sz="2400" dirty="0" smtClean="0"/>
+              <a:t>Launched in April 2008</a:t>
+            </a:r>
+          </a:p>
+          <a:p>
+            <a:r>
+              <a:rPr lang="fr-CA" sz="2400" dirty="0" smtClean="0"/>
+              <a:t>For both personal and commercial use (personal use does not allow private projects)</a:t>
+            </a:r>
           </a:p>
         </p:txBody>
       </p:sp>
@@ -5582,6 +5705,40 @@
               <a:t>9</a:t>
             </a:fld>
             <a:endParaRPr lang="fr-CA"/>
+          </a:p>
+        </p:txBody>
+      </p:sp>
+      <p:sp>
+        <p:nvSpPr>
+          <p:cNvPr id="6" name="ZoneTexte 5"/>
+          <p:cNvSpPr txBox="1"/>
+          <p:nvPr/>
+        </p:nvSpPr>
+        <p:spPr>
+          <a:xfrm>
+            <a:off x="665018" y="4322618"/>
+            <a:ext cx="7802088" cy="1015663"/>
+          </a:xfrm>
+          <a:prstGeom prst="rect">
+            <a:avLst/>
+          </a:prstGeom>
+          <a:noFill/>
+        </p:spPr>
+        <p:txBody>
+          <a:bodyPr wrap="square" rtlCol="0">
+            <a:spAutoFit/>
+          </a:bodyPr>
+          <a:lstStyle/>
+          <a:p>
+            <a:pPr algn="ctr"/>
+            <a:r>
+              <a:rPr lang="fr-CA" sz="2000" i="1" dirty="0" smtClean="0"/>
+              <a:t>On 16 January 2013, GitHub announced it had passed the 3 million users mark and now hosting more than 5 million repositories.</a:t>
+            </a:r>
+          </a:p>
+          <a:p>
+            <a:pPr algn="ctr"/>
+            <a:endParaRPr lang="en-CA" sz="2000" dirty="0"/>
           </a:p>
         </p:txBody>
       </p:sp>

</xml_diff>